<commit_message>
Updated architecture PowerPoint slide.
</commit_message>
<xml_diff>
--- a/Documents/BBQ RMS Architecture.pptx
+++ b/Documents/BBQ RMS Architecture.pptx
@@ -288,6 +288,7 @@
           <a:p>
             <a:fld id="{F4DCC2A4-196E-4895-AF31-68C7CF15EE63}" type="datetimeFigureOut">
               <a:rPr lang="en-US" smtClean="0"/>
+              <a:pPr/>
               <a:t>11/15/2010</a:t>
             </a:fld>
             <a:endParaRPr lang="en-US"/>
@@ -330,6 +331,7 @@
           <a:p>
             <a:fld id="{28D9B480-0AFB-4ECF-B410-6F63836D0E2E}" type="slidenum">
               <a:rPr lang="en-US" smtClean="0"/>
+              <a:pPr/>
               <a:t>‹#›</a:t>
             </a:fld>
             <a:endParaRPr lang="en-US"/>
@@ -453,6 +455,7 @@
           <a:p>
             <a:fld id="{F4DCC2A4-196E-4895-AF31-68C7CF15EE63}" type="datetimeFigureOut">
               <a:rPr lang="en-US" smtClean="0"/>
+              <a:pPr/>
               <a:t>11/15/2010</a:t>
             </a:fld>
             <a:endParaRPr lang="en-US"/>
@@ -495,6 +498,7 @@
           <a:p>
             <a:fld id="{28D9B480-0AFB-4ECF-B410-6F63836D0E2E}" type="slidenum">
               <a:rPr lang="en-US" smtClean="0"/>
+              <a:pPr/>
               <a:t>‹#›</a:t>
             </a:fld>
             <a:endParaRPr lang="en-US"/>
@@ -628,6 +632,7 @@
           <a:p>
             <a:fld id="{F4DCC2A4-196E-4895-AF31-68C7CF15EE63}" type="datetimeFigureOut">
               <a:rPr lang="en-US" smtClean="0"/>
+              <a:pPr/>
               <a:t>11/15/2010</a:t>
             </a:fld>
             <a:endParaRPr lang="en-US"/>
@@ -670,6 +675,7 @@
           <a:p>
             <a:fld id="{28D9B480-0AFB-4ECF-B410-6F63836D0E2E}" type="slidenum">
               <a:rPr lang="en-US" smtClean="0"/>
+              <a:pPr/>
               <a:t>‹#›</a:t>
             </a:fld>
             <a:endParaRPr lang="en-US"/>
@@ -793,6 +799,7 @@
           <a:p>
             <a:fld id="{F4DCC2A4-196E-4895-AF31-68C7CF15EE63}" type="datetimeFigureOut">
               <a:rPr lang="en-US" smtClean="0"/>
+              <a:pPr/>
               <a:t>11/15/2010</a:t>
             </a:fld>
             <a:endParaRPr lang="en-US"/>
@@ -835,6 +842,7 @@
           <a:p>
             <a:fld id="{28D9B480-0AFB-4ECF-B410-6F63836D0E2E}" type="slidenum">
               <a:rPr lang="en-US" smtClean="0"/>
+              <a:pPr/>
               <a:t>‹#›</a:t>
             </a:fld>
             <a:endParaRPr lang="en-US"/>
@@ -1034,6 +1042,7 @@
           <a:p>
             <a:fld id="{F4DCC2A4-196E-4895-AF31-68C7CF15EE63}" type="datetimeFigureOut">
               <a:rPr lang="en-US" smtClean="0"/>
+              <a:pPr/>
               <a:t>11/15/2010</a:t>
             </a:fld>
             <a:endParaRPr lang="en-US"/>
@@ -1076,6 +1085,7 @@
           <a:p>
             <a:fld id="{28D9B480-0AFB-4ECF-B410-6F63836D0E2E}" type="slidenum">
               <a:rPr lang="en-US" smtClean="0"/>
+              <a:pPr/>
               <a:t>‹#›</a:t>
             </a:fld>
             <a:endParaRPr lang="en-US"/>
@@ -1317,6 +1327,7 @@
           <a:p>
             <a:fld id="{F4DCC2A4-196E-4895-AF31-68C7CF15EE63}" type="datetimeFigureOut">
               <a:rPr lang="en-US" smtClean="0"/>
+              <a:pPr/>
               <a:t>11/15/2010</a:t>
             </a:fld>
             <a:endParaRPr lang="en-US"/>
@@ -1359,6 +1370,7 @@
           <a:p>
             <a:fld id="{28D9B480-0AFB-4ECF-B410-6F63836D0E2E}" type="slidenum">
               <a:rPr lang="en-US" smtClean="0"/>
+              <a:pPr/>
               <a:t>‹#›</a:t>
             </a:fld>
             <a:endParaRPr lang="en-US"/>
@@ -1734,6 +1746,7 @@
           <a:p>
             <a:fld id="{F4DCC2A4-196E-4895-AF31-68C7CF15EE63}" type="datetimeFigureOut">
               <a:rPr lang="en-US" smtClean="0"/>
+              <a:pPr/>
               <a:t>11/15/2010</a:t>
             </a:fld>
             <a:endParaRPr lang="en-US"/>
@@ -1776,6 +1789,7 @@
           <a:p>
             <a:fld id="{28D9B480-0AFB-4ECF-B410-6F63836D0E2E}" type="slidenum">
               <a:rPr lang="en-US" smtClean="0"/>
+              <a:pPr/>
               <a:t>‹#›</a:t>
             </a:fld>
             <a:endParaRPr lang="en-US"/>
@@ -1847,6 +1861,7 @@
           <a:p>
             <a:fld id="{F4DCC2A4-196E-4895-AF31-68C7CF15EE63}" type="datetimeFigureOut">
               <a:rPr lang="en-US" smtClean="0"/>
+              <a:pPr/>
               <a:t>11/15/2010</a:t>
             </a:fld>
             <a:endParaRPr lang="en-US"/>
@@ -1889,6 +1904,7 @@
           <a:p>
             <a:fld id="{28D9B480-0AFB-4ECF-B410-6F63836D0E2E}" type="slidenum">
               <a:rPr lang="en-US" smtClean="0"/>
+              <a:pPr/>
               <a:t>‹#›</a:t>
             </a:fld>
             <a:endParaRPr lang="en-US"/>
@@ -1937,6 +1953,7 @@
           <a:p>
             <a:fld id="{F4DCC2A4-196E-4895-AF31-68C7CF15EE63}" type="datetimeFigureOut">
               <a:rPr lang="en-US" smtClean="0"/>
+              <a:pPr/>
               <a:t>11/15/2010</a:t>
             </a:fld>
             <a:endParaRPr lang="en-US"/>
@@ -1979,6 +1996,7 @@
           <a:p>
             <a:fld id="{28D9B480-0AFB-4ECF-B410-6F63836D0E2E}" type="slidenum">
               <a:rPr lang="en-US" smtClean="0"/>
+              <a:pPr/>
               <a:t>‹#›</a:t>
             </a:fld>
             <a:endParaRPr lang="en-US"/>
@@ -2209,6 +2227,7 @@
           <a:p>
             <a:fld id="{F4DCC2A4-196E-4895-AF31-68C7CF15EE63}" type="datetimeFigureOut">
               <a:rPr lang="en-US" smtClean="0"/>
+              <a:pPr/>
               <a:t>11/15/2010</a:t>
             </a:fld>
             <a:endParaRPr lang="en-US"/>
@@ -2251,6 +2270,7 @@
           <a:p>
             <a:fld id="{28D9B480-0AFB-4ECF-B410-6F63836D0E2E}" type="slidenum">
               <a:rPr lang="en-US" smtClean="0"/>
+              <a:pPr/>
               <a:t>‹#›</a:t>
             </a:fld>
             <a:endParaRPr lang="en-US"/>
@@ -2457,6 +2477,7 @@
           <a:p>
             <a:fld id="{F4DCC2A4-196E-4895-AF31-68C7CF15EE63}" type="datetimeFigureOut">
               <a:rPr lang="en-US" smtClean="0"/>
+              <a:pPr/>
               <a:t>11/15/2010</a:t>
             </a:fld>
             <a:endParaRPr lang="en-US"/>
@@ -2499,6 +2520,7 @@
           <a:p>
             <a:fld id="{28D9B480-0AFB-4ECF-B410-6F63836D0E2E}" type="slidenum">
               <a:rPr lang="en-US" smtClean="0"/>
+              <a:pPr/>
               <a:t>‹#›</a:t>
             </a:fld>
             <a:endParaRPr lang="en-US"/>
@@ -2665,6 +2687,7 @@
           <a:p>
             <a:fld id="{F4DCC2A4-196E-4895-AF31-68C7CF15EE63}" type="datetimeFigureOut">
               <a:rPr lang="en-US" smtClean="0"/>
+              <a:pPr/>
               <a:t>11/15/2010</a:t>
             </a:fld>
             <a:endParaRPr lang="en-US"/>
@@ -2743,6 +2766,7 @@
           <a:p>
             <a:fld id="{28D9B480-0AFB-4ECF-B410-6F63836D0E2E}" type="slidenum">
               <a:rPr lang="en-US" smtClean="0"/>
+              <a:pPr/>
               <a:t>‹#›</a:t>
             </a:fld>
             <a:endParaRPr lang="en-US"/>
@@ -3035,6 +3059,50 @@
           <a:chExt cx="0" cy="0"/>
         </a:xfrm>
       </p:grpSpPr>
+      <p:sp>
+        <p:nvSpPr>
+          <p:cNvPr id="19" name="Cube 18"/>
+          <p:cNvSpPr/>
+          <p:nvPr/>
+        </p:nvSpPr>
+        <p:spPr>
+          <a:xfrm>
+            <a:off x="4343400" y="3124200"/>
+            <a:ext cx="1828800" cy="685800"/>
+          </a:xfrm>
+          <a:prstGeom prst="cube">
+            <a:avLst/>
+          </a:prstGeom>
+        </p:spPr>
+        <p:style>
+          <a:lnRef idx="2">
+            <a:schemeClr val="accent1">
+              <a:shade val="50000"/>
+            </a:schemeClr>
+          </a:lnRef>
+          <a:fillRef idx="1">
+            <a:schemeClr val="accent1"/>
+          </a:fillRef>
+          <a:effectRef idx="0">
+            <a:schemeClr val="accent1"/>
+          </a:effectRef>
+          <a:fontRef idx="minor">
+            <a:schemeClr val="lt1"/>
+          </a:fontRef>
+        </p:style>
+        <p:txBody>
+          <a:bodyPr rtlCol="0" anchor="ctr"/>
+          <a:lstStyle/>
+          <a:p>
+            <a:pPr algn="ctr"/>
+            <a:r>
+              <a:rPr lang="en-US" dirty="0" smtClean="0"/>
+              <a:t>Cached data</a:t>
+            </a:r>
+            <a:endParaRPr lang="en-US" dirty="0"/>
+          </a:p>
+        </p:txBody>
+      </p:sp>
       <p:cxnSp>
         <p:nvCxnSpPr>
           <p:cNvPr id="16" name="Straight Connector 15"/>
@@ -3043,7 +3111,7 @@
         </p:nvCxnSpPr>
         <p:spPr>
           <a:xfrm>
-            <a:off x="228600" y="4038600"/>
+            <a:off x="228600" y="4191000"/>
             <a:ext cx="7315200" cy="0"/>
           </a:xfrm>
           <a:prstGeom prst="line">
@@ -3051,7 +3119,9 @@
           </a:prstGeom>
           <a:ln w="38100">
             <a:solidFill>
-              <a:schemeClr val="tx1"/>
+              <a:schemeClr val="bg1">
+                <a:lumMod val="65000"/>
+              </a:schemeClr>
             </a:solidFill>
             <a:prstDash val="lgDash"/>
           </a:ln>
@@ -3079,8 +3149,8 @@
         </p:nvSpPr>
         <p:spPr>
           <a:xfrm>
-            <a:off x="2362200" y="3352800"/>
-            <a:ext cx="914400" cy="2514600"/>
+            <a:off x="2362200" y="3124200"/>
+            <a:ext cx="914400" cy="2971800"/>
           </a:xfrm>
           <a:prstGeom prst="cube">
             <a:avLst>
@@ -3148,7 +3218,7 @@
         </p:nvSpPr>
         <p:spPr>
           <a:xfrm>
-            <a:off x="304800" y="4419600"/>
+            <a:off x="304800" y="4648200"/>
             <a:ext cx="1447800" cy="1447800"/>
           </a:xfrm>
           <a:prstGeom prst="cube">
@@ -3209,7 +3279,7 @@
         </p:nvSpPr>
         <p:spPr>
           <a:xfrm>
-            <a:off x="3200400" y="5181600"/>
+            <a:off x="3200400" y="5410200"/>
             <a:ext cx="3810000" cy="685800"/>
           </a:xfrm>
           <a:prstGeom prst="cube">
@@ -3253,7 +3323,7 @@
         </p:nvSpPr>
         <p:spPr>
           <a:xfrm>
-            <a:off x="3200400" y="4572000"/>
+            <a:off x="3200400" y="4800600"/>
             <a:ext cx="2971800" cy="685800"/>
           </a:xfrm>
           <a:prstGeom prst="cube">
@@ -3297,7 +3367,7 @@
         </p:nvSpPr>
         <p:spPr>
           <a:xfrm>
-            <a:off x="304800" y="2743200"/>
+            <a:off x="304800" y="2514600"/>
             <a:ext cx="5867400" cy="685800"/>
           </a:xfrm>
           <a:prstGeom prst="cube">
@@ -3341,8 +3411,8 @@
         </p:nvSpPr>
         <p:spPr>
           <a:xfrm>
-            <a:off x="6096000" y="2743200"/>
-            <a:ext cx="914400" cy="2514600"/>
+            <a:off x="6096000" y="2514600"/>
+            <a:ext cx="914400" cy="2971800"/>
           </a:xfrm>
           <a:prstGeom prst="cube">
             <a:avLst>
@@ -3387,7 +3457,7 @@
         </p:nvSpPr>
         <p:spPr>
           <a:xfrm>
-            <a:off x="304800" y="2133600"/>
+            <a:off x="304800" y="1905000"/>
             <a:ext cx="6705600" cy="685800"/>
           </a:xfrm>
           <a:prstGeom prst="cube">
@@ -3431,7 +3501,7 @@
         </p:nvSpPr>
         <p:spPr>
           <a:xfrm>
-            <a:off x="7467600" y="5181600"/>
+            <a:off x="7467600" y="5410200"/>
             <a:ext cx="1371600" cy="533400"/>
           </a:xfrm>
           <a:prstGeom prst="borderCallout2">
@@ -3506,7 +3576,7 @@
         </p:nvSpPr>
         <p:spPr>
           <a:xfrm>
-            <a:off x="7467600" y="4495800"/>
+            <a:off x="7467600" y="4724400"/>
             <a:ext cx="1371600" cy="533400"/>
           </a:xfrm>
           <a:prstGeom prst="borderCallout2">
@@ -3581,8 +3651,8 @@
         </p:nvCxnSpPr>
         <p:spPr>
           <a:xfrm rot="5400000">
-            <a:off x="4000500" y="4000500"/>
-            <a:ext cx="1143000" cy="1588"/>
+            <a:off x="3163094" y="3999706"/>
+            <a:ext cx="1600200" cy="1588"/>
           </a:xfrm>
           <a:prstGeom prst="straightConnector1">
             <a:avLst/>
@@ -3618,7 +3688,7 @@
         </p:nvSpPr>
         <p:spPr>
           <a:xfrm>
-            <a:off x="7467600" y="3352800"/>
+            <a:off x="7467600" y="3733800"/>
             <a:ext cx="1371600" cy="533400"/>
           </a:xfrm>
           <a:prstGeom prst="borderCallout2">
@@ -3627,8 +3697,8 @@
               <a:gd name="adj2" fmla="val -8333"/>
               <a:gd name="adj3" fmla="val 18750"/>
               <a:gd name="adj4" fmla="val -16667"/>
-              <a:gd name="adj5" fmla="val 91673"/>
-              <a:gd name="adj6" fmla="val -210530"/>
+              <a:gd name="adj5" fmla="val 128523"/>
+              <a:gd name="adj6" fmla="val -256013"/>
             </a:avLst>
           </a:prstGeom>
           <a:solidFill>
@@ -3693,7 +3763,7 @@
         </p:nvSpPr>
         <p:spPr>
           <a:xfrm>
-            <a:off x="7467600" y="2133600"/>
+            <a:off x="7467600" y="1905000"/>
             <a:ext cx="1371600" cy="533400"/>
           </a:xfrm>
           <a:prstGeom prst="borderCallout2">
@@ -3768,15 +3838,17 @@
         </p:nvCxnSpPr>
         <p:spPr>
           <a:xfrm rot="5400000">
-            <a:off x="990600" y="5029200"/>
-            <a:ext cx="1981200" cy="0"/>
+            <a:off x="952500" y="5219700"/>
+            <a:ext cx="2057400" cy="0"/>
           </a:xfrm>
           <a:prstGeom prst="line">
             <a:avLst/>
           </a:prstGeom>
           <a:ln w="38100">
             <a:solidFill>
-              <a:schemeClr val="tx1"/>
+              <a:schemeClr val="bg1">
+                <a:lumMod val="65000"/>
+              </a:schemeClr>
             </a:solidFill>
             <a:prstDash val="lgDash"/>
           </a:ln>
@@ -3804,8 +3876,8 @@
         </p:nvCxnSpPr>
         <p:spPr>
           <a:xfrm rot="5400000">
-            <a:off x="496094" y="3923506"/>
-            <a:ext cx="990600" cy="1588"/>
+            <a:off x="267494" y="3923506"/>
+            <a:ext cx="1447800" cy="1588"/>
           </a:xfrm>
           <a:prstGeom prst="straightConnector1">
             <a:avLst/>
@@ -3841,8 +3913,8 @@
         </p:nvCxnSpPr>
         <p:spPr>
           <a:xfrm rot="10800000" flipV="1">
-            <a:off x="990600" y="3452500"/>
-            <a:ext cx="6230596" cy="357499"/>
+            <a:off x="990600" y="3828515"/>
+            <a:ext cx="6230596" cy="362483"/>
           </a:xfrm>
           <a:prstGeom prst="line">
             <a:avLst/>
@@ -3868,11 +3940,1613 @@
           </a:fontRef>
         </p:style>
       </p:cxnSp>
+      <p:sp>
+        <p:nvSpPr>
+          <p:cNvPr id="34" name="Rectangle 33"/>
+          <p:cNvSpPr/>
+          <p:nvPr/>
+        </p:nvSpPr>
+        <p:spPr>
+          <a:xfrm>
+            <a:off x="7467600" y="2362200"/>
+            <a:ext cx="1371600" cy="533400"/>
+          </a:xfrm>
+          <a:prstGeom prst="rect">
+            <a:avLst/>
+          </a:prstGeom>
+          <a:solidFill>
+            <a:schemeClr val="accent2">
+              <a:lumMod val="50000"/>
+            </a:schemeClr>
+          </a:solidFill>
+          <a:ln>
+            <a:solidFill>
+              <a:schemeClr val="tx1"/>
+            </a:solidFill>
+          </a:ln>
+        </p:spPr>
+        <p:style>
+          <a:lnRef idx="2">
+            <a:schemeClr val="accent1">
+              <a:shade val="50000"/>
+            </a:schemeClr>
+          </a:lnRef>
+          <a:fillRef idx="1">
+            <a:schemeClr val="accent1"/>
+          </a:fillRef>
+          <a:effectRef idx="0">
+            <a:schemeClr val="accent1"/>
+          </a:effectRef>
+          <a:fontRef idx="minor">
+            <a:schemeClr val="lt1"/>
+          </a:fontRef>
+        </p:style>
+        <p:txBody>
+          <a:bodyPr rtlCol="0" anchor="ctr"/>
+          <a:lstStyle/>
+          <a:p>
+            <a:pPr algn="ctr"/>
+            <a:r>
+              <a:rPr lang="en-US" dirty="0" smtClean="0">
+                <a:solidFill>
+                  <a:schemeClr val="accent2">
+                    <a:lumMod val="20000"/>
+                    <a:lumOff val="80000"/>
+                  </a:schemeClr>
+                </a:solidFill>
+              </a:rPr>
+              <a:t>MVVM</a:t>
+            </a:r>
+            <a:endParaRPr lang="en-US" dirty="0" smtClean="0">
+              <a:solidFill>
+                <a:schemeClr val="accent2">
+                  <a:lumMod val="20000"/>
+                  <a:lumOff val="80000"/>
+                </a:schemeClr>
+              </a:solidFill>
+            </a:endParaRPr>
+          </a:p>
+        </p:txBody>
+      </p:sp>
+      <p:cxnSp>
+        <p:nvCxnSpPr>
+          <p:cNvPr id="37" name="Straight Arrow Connector 36"/>
+          <p:cNvCxnSpPr/>
+          <p:nvPr/>
+        </p:nvCxnSpPr>
+        <p:spPr>
+          <a:xfrm rot="10800000" flipV="1">
+            <a:off x="6629400" y="2819400"/>
+            <a:ext cx="1066800" cy="381000"/>
+          </a:xfrm>
+          <a:prstGeom prst="straightConnector1">
+            <a:avLst/>
+          </a:prstGeom>
+          <a:ln w="34925">
+            <a:solidFill>
+              <a:schemeClr val="tx1"/>
+            </a:solidFill>
+            <a:headEnd type="none" w="med" len="med"/>
+            <a:tailEnd type="arrow" w="med" len="med"/>
+          </a:ln>
+        </p:spPr>
+        <p:style>
+          <a:lnRef idx="1">
+            <a:schemeClr val="accent1"/>
+          </a:lnRef>
+          <a:fillRef idx="0">
+            <a:schemeClr val="accent1"/>
+          </a:fillRef>
+          <a:effectRef idx="0">
+            <a:schemeClr val="accent1"/>
+          </a:effectRef>
+          <a:fontRef idx="minor">
+            <a:schemeClr val="tx1"/>
+          </a:fontRef>
+        </p:style>
+      </p:cxnSp>
+      <p:cxnSp>
+        <p:nvCxnSpPr>
+          <p:cNvPr id="38" name="Straight Arrow Connector 37"/>
+          <p:cNvCxnSpPr/>
+          <p:nvPr/>
+        </p:nvCxnSpPr>
+        <p:spPr>
+          <a:xfrm rot="10800000">
+            <a:off x="5638800" y="2286000"/>
+            <a:ext cx="2057400" cy="381000"/>
+          </a:xfrm>
+          <a:prstGeom prst="straightConnector1">
+            <a:avLst/>
+          </a:prstGeom>
+          <a:ln w="34925">
+            <a:solidFill>
+              <a:schemeClr val="tx1"/>
+            </a:solidFill>
+            <a:headEnd type="none" w="med" len="med"/>
+            <a:tailEnd type="arrow" w="med" len="med"/>
+          </a:ln>
+        </p:spPr>
+        <p:style>
+          <a:lnRef idx="1">
+            <a:schemeClr val="accent1"/>
+          </a:lnRef>
+          <a:fillRef idx="0">
+            <a:schemeClr val="accent1"/>
+          </a:fillRef>
+          <a:effectRef idx="0">
+            <a:schemeClr val="accent1"/>
+          </a:effectRef>
+          <a:fontRef idx="minor">
+            <a:schemeClr val="tx1"/>
+          </a:fontRef>
+        </p:style>
+      </p:cxnSp>
+      <p:cxnSp>
+        <p:nvCxnSpPr>
+          <p:cNvPr id="39" name="Straight Arrow Connector 38"/>
+          <p:cNvCxnSpPr/>
+          <p:nvPr/>
+        </p:nvCxnSpPr>
+        <p:spPr>
+          <a:xfrm rot="10800000" flipV="1">
+            <a:off x="4724400" y="2743200"/>
+            <a:ext cx="2971800" cy="152400"/>
+          </a:xfrm>
+          <a:prstGeom prst="straightConnector1">
+            <a:avLst/>
+          </a:prstGeom>
+          <a:ln w="34925">
+            <a:solidFill>
+              <a:schemeClr val="tx1"/>
+            </a:solidFill>
+            <a:headEnd type="none" w="med" len="med"/>
+            <a:tailEnd type="arrow" w="med" len="med"/>
+          </a:ln>
+        </p:spPr>
+        <p:style>
+          <a:lnRef idx="1">
+            <a:schemeClr val="accent1"/>
+          </a:lnRef>
+          <a:fillRef idx="0">
+            <a:schemeClr val="accent1"/>
+          </a:fillRef>
+          <a:effectRef idx="0">
+            <a:schemeClr val="accent1"/>
+          </a:effectRef>
+          <a:fontRef idx="minor">
+            <a:schemeClr val="tx1"/>
+          </a:fontRef>
+        </p:style>
+      </p:cxnSp>
+      <p:pic>
+        <p:nvPicPr>
+          <p:cNvPr id="1026" name="Picture 2" descr="Logo"/>
+          <p:cNvPicPr>
+            <a:picLocks noChangeAspect="1" noChangeArrowheads="1"/>
+          </p:cNvPicPr>
+          <p:nvPr/>
+        </p:nvPicPr>
+        <p:blipFill>
+          <a:blip r:embed="rId2" cstate="print"/>
+          <a:srcRect/>
+          <a:stretch>
+            <a:fillRect/>
+          </a:stretch>
+        </p:blipFill>
+        <p:spPr bwMode="auto">
+          <a:xfrm>
+            <a:off x="228600" y="228600"/>
+            <a:ext cx="1219200" cy="1051474"/>
+          </a:xfrm>
+          <a:prstGeom prst="rect">
+            <a:avLst/>
+          </a:prstGeom>
+          <a:noFill/>
+          <a:ln w="9525">
+            <a:noFill/>
+            <a:miter lim="800000"/>
+            <a:headEnd/>
+            <a:tailEnd/>
+          </a:ln>
+        </p:spPr>
+      </p:pic>
     </p:spTree>
   </p:cSld>
   <p:clrMapOvr>
     <a:masterClrMapping/>
   </p:clrMapOvr>
+  <p:timing>
+    <p:tnLst>
+      <p:par>
+        <p:cTn id="1" dur="indefinite" restart="never" nodeType="tmRoot">
+          <p:childTnLst>
+            <p:seq concurrent="1" nextAc="seek">
+              <p:cTn id="2" dur="indefinite" nodeType="mainSeq">
+                <p:childTnLst>
+                  <p:par>
+                    <p:cTn id="3" fill="hold">
+                      <p:stCondLst>
+                        <p:cond delay="indefinite"/>
+                      </p:stCondLst>
+                      <p:childTnLst>
+                        <p:par>
+                          <p:cTn id="4" fill="hold">
+                            <p:stCondLst>
+                              <p:cond delay="0"/>
+                            </p:stCondLst>
+                            <p:childTnLst>
+                              <p:par>
+                                <p:cTn id="5" presetID="2" presetClass="entr" presetSubtype="4" fill="hold" grpId="0" nodeType="clickEffect">
+                                  <p:stCondLst>
+                                    <p:cond delay="0"/>
+                                  </p:stCondLst>
+                                  <p:childTnLst>
+                                    <p:set>
+                                      <p:cBhvr>
+                                        <p:cTn id="6" dur="1" fill="hold">
+                                          <p:stCondLst>
+                                            <p:cond delay="0"/>
+                                          </p:stCondLst>
+                                        </p:cTn>
+                                        <p:tgtEl>
+                                          <p:spTgt spid="13"/>
+                                        </p:tgtEl>
+                                        <p:attrNameLst>
+                                          <p:attrName>style.visibility</p:attrName>
+                                        </p:attrNameLst>
+                                      </p:cBhvr>
+                                      <p:to>
+                                        <p:strVal val="visible"/>
+                                      </p:to>
+                                    </p:set>
+                                    <p:anim calcmode="lin" valueType="num">
+                                      <p:cBhvr additive="base">
+                                        <p:cTn id="7" dur="500" fill="hold"/>
+                                        <p:tgtEl>
+                                          <p:spTgt spid="13"/>
+                                        </p:tgtEl>
+                                        <p:attrNameLst>
+                                          <p:attrName>ppt_x</p:attrName>
+                                        </p:attrNameLst>
+                                      </p:cBhvr>
+                                      <p:tavLst>
+                                        <p:tav tm="0">
+                                          <p:val>
+                                            <p:strVal val="#ppt_x"/>
+                                          </p:val>
+                                        </p:tav>
+                                        <p:tav tm="100000">
+                                          <p:val>
+                                            <p:strVal val="#ppt_x"/>
+                                          </p:val>
+                                        </p:tav>
+                                      </p:tavLst>
+                                    </p:anim>
+                                    <p:anim calcmode="lin" valueType="num">
+                                      <p:cBhvr additive="base">
+                                        <p:cTn id="8" dur="500" fill="hold"/>
+                                        <p:tgtEl>
+                                          <p:spTgt spid="13"/>
+                                        </p:tgtEl>
+                                        <p:attrNameLst>
+                                          <p:attrName>ppt_y</p:attrName>
+                                        </p:attrNameLst>
+                                      </p:cBhvr>
+                                      <p:tavLst>
+                                        <p:tav tm="0">
+                                          <p:val>
+                                            <p:strVal val="1+#ppt_h/2"/>
+                                          </p:val>
+                                        </p:tav>
+                                        <p:tav tm="100000">
+                                          <p:val>
+                                            <p:strVal val="#ppt_y"/>
+                                          </p:val>
+                                        </p:tav>
+                                      </p:tavLst>
+                                    </p:anim>
+                                  </p:childTnLst>
+                                </p:cTn>
+                              </p:par>
+                              <p:par>
+                                <p:cTn id="9" presetID="2" presetClass="entr" presetSubtype="4" fill="hold" grpId="0" nodeType="withEffect">
+                                  <p:stCondLst>
+                                    <p:cond delay="0"/>
+                                  </p:stCondLst>
+                                  <p:childTnLst>
+                                    <p:set>
+                                      <p:cBhvr>
+                                        <p:cTn id="10" dur="1" fill="hold">
+                                          <p:stCondLst>
+                                            <p:cond delay="0"/>
+                                          </p:stCondLst>
+                                        </p:cTn>
+                                        <p:tgtEl>
+                                          <p:spTgt spid="14"/>
+                                        </p:tgtEl>
+                                        <p:attrNameLst>
+                                          <p:attrName>style.visibility</p:attrName>
+                                        </p:attrNameLst>
+                                      </p:cBhvr>
+                                      <p:to>
+                                        <p:strVal val="visible"/>
+                                      </p:to>
+                                    </p:set>
+                                    <p:anim calcmode="lin" valueType="num">
+                                      <p:cBhvr additive="base">
+                                        <p:cTn id="11" dur="500" fill="hold"/>
+                                        <p:tgtEl>
+                                          <p:spTgt spid="14"/>
+                                        </p:tgtEl>
+                                        <p:attrNameLst>
+                                          <p:attrName>ppt_x</p:attrName>
+                                        </p:attrNameLst>
+                                      </p:cBhvr>
+                                      <p:tavLst>
+                                        <p:tav tm="0">
+                                          <p:val>
+                                            <p:strVal val="#ppt_x"/>
+                                          </p:val>
+                                        </p:tav>
+                                        <p:tav tm="100000">
+                                          <p:val>
+                                            <p:strVal val="#ppt_x"/>
+                                          </p:val>
+                                        </p:tav>
+                                      </p:tavLst>
+                                    </p:anim>
+                                    <p:anim calcmode="lin" valueType="num">
+                                      <p:cBhvr additive="base">
+                                        <p:cTn id="12" dur="500" fill="hold"/>
+                                        <p:tgtEl>
+                                          <p:spTgt spid="14"/>
+                                        </p:tgtEl>
+                                        <p:attrNameLst>
+                                          <p:attrName>ppt_y</p:attrName>
+                                        </p:attrNameLst>
+                                      </p:cBhvr>
+                                      <p:tavLst>
+                                        <p:tav tm="0">
+                                          <p:val>
+                                            <p:strVal val="1+#ppt_h/2"/>
+                                          </p:val>
+                                        </p:tav>
+                                        <p:tav tm="100000">
+                                          <p:val>
+                                            <p:strVal val="#ppt_y"/>
+                                          </p:val>
+                                        </p:tav>
+                                      </p:tavLst>
+                                    </p:anim>
+                                  </p:childTnLst>
+                                </p:cTn>
+                              </p:par>
+                              <p:par>
+                                <p:cTn id="13" presetID="2" presetClass="entr" presetSubtype="4" fill="hold" grpId="0" nodeType="withEffect">
+                                  <p:stCondLst>
+                                    <p:cond delay="0"/>
+                                  </p:stCondLst>
+                                  <p:childTnLst>
+                                    <p:set>
+                                      <p:cBhvr>
+                                        <p:cTn id="14" dur="1" fill="hold">
+                                          <p:stCondLst>
+                                            <p:cond delay="0"/>
+                                          </p:stCondLst>
+                                        </p:cTn>
+                                        <p:tgtEl>
+                                          <p:spTgt spid="25"/>
+                                        </p:tgtEl>
+                                        <p:attrNameLst>
+                                          <p:attrName>style.visibility</p:attrName>
+                                        </p:attrNameLst>
+                                      </p:cBhvr>
+                                      <p:to>
+                                        <p:strVal val="visible"/>
+                                      </p:to>
+                                    </p:set>
+                                    <p:anim calcmode="lin" valueType="num">
+                                      <p:cBhvr additive="base">
+                                        <p:cTn id="15" dur="500" fill="hold"/>
+                                        <p:tgtEl>
+                                          <p:spTgt spid="25"/>
+                                        </p:tgtEl>
+                                        <p:attrNameLst>
+                                          <p:attrName>ppt_x</p:attrName>
+                                        </p:attrNameLst>
+                                      </p:cBhvr>
+                                      <p:tavLst>
+                                        <p:tav tm="0">
+                                          <p:val>
+                                            <p:strVal val="#ppt_x"/>
+                                          </p:val>
+                                        </p:tav>
+                                        <p:tav tm="100000">
+                                          <p:val>
+                                            <p:strVal val="#ppt_x"/>
+                                          </p:val>
+                                        </p:tav>
+                                      </p:tavLst>
+                                    </p:anim>
+                                    <p:anim calcmode="lin" valueType="num">
+                                      <p:cBhvr additive="base">
+                                        <p:cTn id="16" dur="500" fill="hold"/>
+                                        <p:tgtEl>
+                                          <p:spTgt spid="25"/>
+                                        </p:tgtEl>
+                                        <p:attrNameLst>
+                                          <p:attrName>ppt_y</p:attrName>
+                                        </p:attrNameLst>
+                                      </p:cBhvr>
+                                      <p:tavLst>
+                                        <p:tav tm="0">
+                                          <p:val>
+                                            <p:strVal val="1+#ppt_h/2"/>
+                                          </p:val>
+                                        </p:tav>
+                                        <p:tav tm="100000">
+                                          <p:val>
+                                            <p:strVal val="#ppt_y"/>
+                                          </p:val>
+                                        </p:tav>
+                                      </p:tavLst>
+                                    </p:anim>
+                                  </p:childTnLst>
+                                </p:cTn>
+                              </p:par>
+                              <p:par>
+                                <p:cTn id="17" presetID="2" presetClass="entr" presetSubtype="4" fill="hold" grpId="0" nodeType="withEffect">
+                                  <p:stCondLst>
+                                    <p:cond delay="0"/>
+                                  </p:stCondLst>
+                                  <p:childTnLst>
+                                    <p:set>
+                                      <p:cBhvr>
+                                        <p:cTn id="18" dur="1" fill="hold">
+                                          <p:stCondLst>
+                                            <p:cond delay="0"/>
+                                          </p:stCondLst>
+                                        </p:cTn>
+                                        <p:tgtEl>
+                                          <p:spTgt spid="26"/>
+                                        </p:tgtEl>
+                                        <p:attrNameLst>
+                                          <p:attrName>style.visibility</p:attrName>
+                                        </p:attrNameLst>
+                                      </p:cBhvr>
+                                      <p:to>
+                                        <p:strVal val="visible"/>
+                                      </p:to>
+                                    </p:set>
+                                    <p:anim calcmode="lin" valueType="num">
+                                      <p:cBhvr additive="base">
+                                        <p:cTn id="19" dur="500" fill="hold"/>
+                                        <p:tgtEl>
+                                          <p:spTgt spid="26"/>
+                                        </p:tgtEl>
+                                        <p:attrNameLst>
+                                          <p:attrName>ppt_x</p:attrName>
+                                        </p:attrNameLst>
+                                      </p:cBhvr>
+                                      <p:tavLst>
+                                        <p:tav tm="0">
+                                          <p:val>
+                                            <p:strVal val="#ppt_x"/>
+                                          </p:val>
+                                        </p:tav>
+                                        <p:tav tm="100000">
+                                          <p:val>
+                                            <p:strVal val="#ppt_x"/>
+                                          </p:val>
+                                        </p:tav>
+                                      </p:tavLst>
+                                    </p:anim>
+                                    <p:anim calcmode="lin" valueType="num">
+                                      <p:cBhvr additive="base">
+                                        <p:cTn id="20" dur="500" fill="hold"/>
+                                        <p:tgtEl>
+                                          <p:spTgt spid="26"/>
+                                        </p:tgtEl>
+                                        <p:attrNameLst>
+                                          <p:attrName>ppt_y</p:attrName>
+                                        </p:attrNameLst>
+                                      </p:cBhvr>
+                                      <p:tavLst>
+                                        <p:tav tm="0">
+                                          <p:val>
+                                            <p:strVal val="1+#ppt_h/2"/>
+                                          </p:val>
+                                        </p:tav>
+                                        <p:tav tm="100000">
+                                          <p:val>
+                                            <p:strVal val="#ppt_y"/>
+                                          </p:val>
+                                        </p:tav>
+                                      </p:tavLst>
+                                    </p:anim>
+                                  </p:childTnLst>
+                                </p:cTn>
+                              </p:par>
+                              <p:par>
+                                <p:cTn id="21" presetID="2" presetClass="entr" presetSubtype="4" fill="hold" nodeType="withEffect">
+                                  <p:stCondLst>
+                                    <p:cond delay="0"/>
+                                  </p:stCondLst>
+                                  <p:childTnLst>
+                                    <p:set>
+                                      <p:cBhvr>
+                                        <p:cTn id="22" dur="1" fill="hold">
+                                          <p:stCondLst>
+                                            <p:cond delay="0"/>
+                                          </p:stCondLst>
+                                        </p:cTn>
+                                        <p:tgtEl>
+                                          <p:spTgt spid="30"/>
+                                        </p:tgtEl>
+                                        <p:attrNameLst>
+                                          <p:attrName>style.visibility</p:attrName>
+                                        </p:attrNameLst>
+                                      </p:cBhvr>
+                                      <p:to>
+                                        <p:strVal val="visible"/>
+                                      </p:to>
+                                    </p:set>
+                                    <p:anim calcmode="lin" valueType="num">
+                                      <p:cBhvr additive="base">
+                                        <p:cTn id="23" dur="500" fill="hold"/>
+                                        <p:tgtEl>
+                                          <p:spTgt spid="30"/>
+                                        </p:tgtEl>
+                                        <p:attrNameLst>
+                                          <p:attrName>ppt_x</p:attrName>
+                                        </p:attrNameLst>
+                                      </p:cBhvr>
+                                      <p:tavLst>
+                                        <p:tav tm="0">
+                                          <p:val>
+                                            <p:strVal val="#ppt_x"/>
+                                          </p:val>
+                                        </p:tav>
+                                        <p:tav tm="100000">
+                                          <p:val>
+                                            <p:strVal val="#ppt_x"/>
+                                          </p:val>
+                                        </p:tav>
+                                      </p:tavLst>
+                                    </p:anim>
+                                    <p:anim calcmode="lin" valueType="num">
+                                      <p:cBhvr additive="base">
+                                        <p:cTn id="24" dur="500" fill="hold"/>
+                                        <p:tgtEl>
+                                          <p:spTgt spid="30"/>
+                                        </p:tgtEl>
+                                        <p:attrNameLst>
+                                          <p:attrName>ppt_y</p:attrName>
+                                        </p:attrNameLst>
+                                      </p:cBhvr>
+                                      <p:tavLst>
+                                        <p:tav tm="0">
+                                          <p:val>
+                                            <p:strVal val="1+#ppt_h/2"/>
+                                          </p:val>
+                                        </p:tav>
+                                        <p:tav tm="100000">
+                                          <p:val>
+                                            <p:strVal val="#ppt_y"/>
+                                          </p:val>
+                                        </p:tav>
+                                      </p:tavLst>
+                                    </p:anim>
+                                  </p:childTnLst>
+                                </p:cTn>
+                              </p:par>
+                              <p:par>
+                                <p:cTn id="25" presetID="2" presetClass="entr" presetSubtype="4" fill="hold" nodeType="withEffect">
+                                  <p:stCondLst>
+                                    <p:cond delay="0"/>
+                                  </p:stCondLst>
+                                  <p:childTnLst>
+                                    <p:set>
+                                      <p:cBhvr>
+                                        <p:cTn id="26" dur="1" fill="hold">
+                                          <p:stCondLst>
+                                            <p:cond delay="0"/>
+                                          </p:stCondLst>
+                                        </p:cTn>
+                                        <p:tgtEl>
+                                          <p:spTgt spid="35"/>
+                                        </p:tgtEl>
+                                        <p:attrNameLst>
+                                          <p:attrName>style.visibility</p:attrName>
+                                        </p:attrNameLst>
+                                      </p:cBhvr>
+                                      <p:to>
+                                        <p:strVal val="visible"/>
+                                      </p:to>
+                                    </p:set>
+                                    <p:anim calcmode="lin" valueType="num">
+                                      <p:cBhvr additive="base">
+                                        <p:cTn id="27" dur="500" fill="hold"/>
+                                        <p:tgtEl>
+                                          <p:spTgt spid="35"/>
+                                        </p:tgtEl>
+                                        <p:attrNameLst>
+                                          <p:attrName>ppt_x</p:attrName>
+                                        </p:attrNameLst>
+                                      </p:cBhvr>
+                                      <p:tavLst>
+                                        <p:tav tm="0">
+                                          <p:val>
+                                            <p:strVal val="#ppt_x"/>
+                                          </p:val>
+                                        </p:tav>
+                                        <p:tav tm="100000">
+                                          <p:val>
+                                            <p:strVal val="#ppt_x"/>
+                                          </p:val>
+                                        </p:tav>
+                                      </p:tavLst>
+                                    </p:anim>
+                                    <p:anim calcmode="lin" valueType="num">
+                                      <p:cBhvr additive="base">
+                                        <p:cTn id="28" dur="500" fill="hold"/>
+                                        <p:tgtEl>
+                                          <p:spTgt spid="35"/>
+                                        </p:tgtEl>
+                                        <p:attrNameLst>
+                                          <p:attrName>ppt_y</p:attrName>
+                                        </p:attrNameLst>
+                                      </p:cBhvr>
+                                      <p:tavLst>
+                                        <p:tav tm="0">
+                                          <p:val>
+                                            <p:strVal val="1+#ppt_h/2"/>
+                                          </p:val>
+                                        </p:tav>
+                                        <p:tav tm="100000">
+                                          <p:val>
+                                            <p:strVal val="#ppt_y"/>
+                                          </p:val>
+                                        </p:tav>
+                                      </p:tavLst>
+                                    </p:anim>
+                                  </p:childTnLst>
+                                </p:cTn>
+                              </p:par>
+                              <p:par>
+                                <p:cTn id="29" presetID="2" presetClass="entr" presetSubtype="4" fill="hold" nodeType="withEffect">
+                                  <p:stCondLst>
+                                    <p:cond delay="0"/>
+                                  </p:stCondLst>
+                                  <p:childTnLst>
+                                    <p:set>
+                                      <p:cBhvr>
+                                        <p:cTn id="30" dur="1" fill="hold">
+                                          <p:stCondLst>
+                                            <p:cond delay="0"/>
+                                          </p:stCondLst>
+                                        </p:cTn>
+                                        <p:tgtEl>
+                                          <p:spTgt spid="24"/>
+                                        </p:tgtEl>
+                                        <p:attrNameLst>
+                                          <p:attrName>style.visibility</p:attrName>
+                                        </p:attrNameLst>
+                                      </p:cBhvr>
+                                      <p:to>
+                                        <p:strVal val="visible"/>
+                                      </p:to>
+                                    </p:set>
+                                    <p:anim calcmode="lin" valueType="num">
+                                      <p:cBhvr additive="base">
+                                        <p:cTn id="31" dur="500" fill="hold"/>
+                                        <p:tgtEl>
+                                          <p:spTgt spid="24"/>
+                                        </p:tgtEl>
+                                        <p:attrNameLst>
+                                          <p:attrName>ppt_x</p:attrName>
+                                        </p:attrNameLst>
+                                      </p:cBhvr>
+                                      <p:tavLst>
+                                        <p:tav tm="0">
+                                          <p:val>
+                                            <p:strVal val="#ppt_x"/>
+                                          </p:val>
+                                        </p:tav>
+                                        <p:tav tm="100000">
+                                          <p:val>
+                                            <p:strVal val="#ppt_x"/>
+                                          </p:val>
+                                        </p:tav>
+                                      </p:tavLst>
+                                    </p:anim>
+                                    <p:anim calcmode="lin" valueType="num">
+                                      <p:cBhvr additive="base">
+                                        <p:cTn id="32" dur="500" fill="hold"/>
+                                        <p:tgtEl>
+                                          <p:spTgt spid="24"/>
+                                        </p:tgtEl>
+                                        <p:attrNameLst>
+                                          <p:attrName>ppt_y</p:attrName>
+                                        </p:attrNameLst>
+                                      </p:cBhvr>
+                                      <p:tavLst>
+                                        <p:tav tm="0">
+                                          <p:val>
+                                            <p:strVal val="1+#ppt_h/2"/>
+                                          </p:val>
+                                        </p:tav>
+                                        <p:tav tm="100000">
+                                          <p:val>
+                                            <p:strVal val="#ppt_y"/>
+                                          </p:val>
+                                        </p:tav>
+                                      </p:tavLst>
+                                    </p:anim>
+                                  </p:childTnLst>
+                                </p:cTn>
+                              </p:par>
+                            </p:childTnLst>
+                          </p:cTn>
+                        </p:par>
+                      </p:childTnLst>
+                    </p:cTn>
+                  </p:par>
+                  <p:par>
+                    <p:cTn id="33" fill="hold">
+                      <p:stCondLst>
+                        <p:cond delay="indefinite"/>
+                      </p:stCondLst>
+                      <p:childTnLst>
+                        <p:par>
+                          <p:cTn id="34" fill="hold">
+                            <p:stCondLst>
+                              <p:cond delay="0"/>
+                            </p:stCondLst>
+                            <p:childTnLst>
+                              <p:par>
+                                <p:cTn id="35" presetID="2" presetClass="exit" presetSubtype="4" fill="hold" grpId="1" nodeType="clickEffect">
+                                  <p:stCondLst>
+                                    <p:cond delay="0"/>
+                                  </p:stCondLst>
+                                  <p:childTnLst>
+                                    <p:anim calcmode="lin" valueType="num">
+                                      <p:cBhvr additive="base">
+                                        <p:cTn id="36" dur="500"/>
+                                        <p:tgtEl>
+                                          <p:spTgt spid="26"/>
+                                        </p:tgtEl>
+                                        <p:attrNameLst>
+                                          <p:attrName>ppt_x</p:attrName>
+                                        </p:attrNameLst>
+                                      </p:cBhvr>
+                                      <p:tavLst>
+                                        <p:tav tm="0">
+                                          <p:val>
+                                            <p:strVal val="ppt_x"/>
+                                          </p:val>
+                                        </p:tav>
+                                        <p:tav tm="100000">
+                                          <p:val>
+                                            <p:strVal val="ppt_x"/>
+                                          </p:val>
+                                        </p:tav>
+                                      </p:tavLst>
+                                    </p:anim>
+                                    <p:anim calcmode="lin" valueType="num">
+                                      <p:cBhvr additive="base">
+                                        <p:cTn id="37" dur="500"/>
+                                        <p:tgtEl>
+                                          <p:spTgt spid="26"/>
+                                        </p:tgtEl>
+                                        <p:attrNameLst>
+                                          <p:attrName>ppt_y</p:attrName>
+                                        </p:attrNameLst>
+                                      </p:cBhvr>
+                                      <p:tavLst>
+                                        <p:tav tm="0">
+                                          <p:val>
+                                            <p:strVal val="ppt_y"/>
+                                          </p:val>
+                                        </p:tav>
+                                        <p:tav tm="100000">
+                                          <p:val>
+                                            <p:strVal val="1+ppt_h/2"/>
+                                          </p:val>
+                                        </p:tav>
+                                      </p:tavLst>
+                                    </p:anim>
+                                    <p:set>
+                                      <p:cBhvr>
+                                        <p:cTn id="38" dur="1" fill="hold">
+                                          <p:stCondLst>
+                                            <p:cond delay="499"/>
+                                          </p:stCondLst>
+                                        </p:cTn>
+                                        <p:tgtEl>
+                                          <p:spTgt spid="26"/>
+                                        </p:tgtEl>
+                                        <p:attrNameLst>
+                                          <p:attrName>style.visibility</p:attrName>
+                                        </p:attrNameLst>
+                                      </p:cBhvr>
+                                      <p:to>
+                                        <p:strVal val="hidden"/>
+                                      </p:to>
+                                    </p:set>
+                                  </p:childTnLst>
+                                </p:cTn>
+                              </p:par>
+                              <p:par>
+                                <p:cTn id="39" presetID="2" presetClass="exit" presetSubtype="4" fill="hold" grpId="1" nodeType="withEffect">
+                                  <p:stCondLst>
+                                    <p:cond delay="0"/>
+                                  </p:stCondLst>
+                                  <p:childTnLst>
+                                    <p:anim calcmode="lin" valueType="num">
+                                      <p:cBhvr additive="base">
+                                        <p:cTn id="40" dur="500"/>
+                                        <p:tgtEl>
+                                          <p:spTgt spid="25"/>
+                                        </p:tgtEl>
+                                        <p:attrNameLst>
+                                          <p:attrName>ppt_x</p:attrName>
+                                        </p:attrNameLst>
+                                      </p:cBhvr>
+                                      <p:tavLst>
+                                        <p:tav tm="0">
+                                          <p:val>
+                                            <p:strVal val="ppt_x"/>
+                                          </p:val>
+                                        </p:tav>
+                                        <p:tav tm="100000">
+                                          <p:val>
+                                            <p:strVal val="ppt_x"/>
+                                          </p:val>
+                                        </p:tav>
+                                      </p:tavLst>
+                                    </p:anim>
+                                    <p:anim calcmode="lin" valueType="num">
+                                      <p:cBhvr additive="base">
+                                        <p:cTn id="41" dur="500"/>
+                                        <p:tgtEl>
+                                          <p:spTgt spid="25"/>
+                                        </p:tgtEl>
+                                        <p:attrNameLst>
+                                          <p:attrName>ppt_y</p:attrName>
+                                        </p:attrNameLst>
+                                      </p:cBhvr>
+                                      <p:tavLst>
+                                        <p:tav tm="0">
+                                          <p:val>
+                                            <p:strVal val="ppt_y"/>
+                                          </p:val>
+                                        </p:tav>
+                                        <p:tav tm="100000">
+                                          <p:val>
+                                            <p:strVal val="1+ppt_h/2"/>
+                                          </p:val>
+                                        </p:tav>
+                                      </p:tavLst>
+                                    </p:anim>
+                                    <p:set>
+                                      <p:cBhvr>
+                                        <p:cTn id="42" dur="1" fill="hold">
+                                          <p:stCondLst>
+                                            <p:cond delay="499"/>
+                                          </p:stCondLst>
+                                        </p:cTn>
+                                        <p:tgtEl>
+                                          <p:spTgt spid="25"/>
+                                        </p:tgtEl>
+                                        <p:attrNameLst>
+                                          <p:attrName>style.visibility</p:attrName>
+                                        </p:attrNameLst>
+                                      </p:cBhvr>
+                                      <p:to>
+                                        <p:strVal val="hidden"/>
+                                      </p:to>
+                                    </p:set>
+                                  </p:childTnLst>
+                                </p:cTn>
+                              </p:par>
+                              <p:par>
+                                <p:cTn id="43" presetID="2" presetClass="exit" presetSubtype="4" fill="hold" grpId="1" nodeType="withEffect">
+                                  <p:stCondLst>
+                                    <p:cond delay="0"/>
+                                  </p:stCondLst>
+                                  <p:childTnLst>
+                                    <p:anim calcmode="lin" valueType="num">
+                                      <p:cBhvr additive="base">
+                                        <p:cTn id="44" dur="500"/>
+                                        <p:tgtEl>
+                                          <p:spTgt spid="14"/>
+                                        </p:tgtEl>
+                                        <p:attrNameLst>
+                                          <p:attrName>ppt_x</p:attrName>
+                                        </p:attrNameLst>
+                                      </p:cBhvr>
+                                      <p:tavLst>
+                                        <p:tav tm="0">
+                                          <p:val>
+                                            <p:strVal val="ppt_x"/>
+                                          </p:val>
+                                        </p:tav>
+                                        <p:tav tm="100000">
+                                          <p:val>
+                                            <p:strVal val="ppt_x"/>
+                                          </p:val>
+                                        </p:tav>
+                                      </p:tavLst>
+                                    </p:anim>
+                                    <p:anim calcmode="lin" valueType="num">
+                                      <p:cBhvr additive="base">
+                                        <p:cTn id="45" dur="500"/>
+                                        <p:tgtEl>
+                                          <p:spTgt spid="14"/>
+                                        </p:tgtEl>
+                                        <p:attrNameLst>
+                                          <p:attrName>ppt_y</p:attrName>
+                                        </p:attrNameLst>
+                                      </p:cBhvr>
+                                      <p:tavLst>
+                                        <p:tav tm="0">
+                                          <p:val>
+                                            <p:strVal val="ppt_y"/>
+                                          </p:val>
+                                        </p:tav>
+                                        <p:tav tm="100000">
+                                          <p:val>
+                                            <p:strVal val="1+ppt_h/2"/>
+                                          </p:val>
+                                        </p:tav>
+                                      </p:tavLst>
+                                    </p:anim>
+                                    <p:set>
+                                      <p:cBhvr>
+                                        <p:cTn id="46" dur="1" fill="hold">
+                                          <p:stCondLst>
+                                            <p:cond delay="499"/>
+                                          </p:stCondLst>
+                                        </p:cTn>
+                                        <p:tgtEl>
+                                          <p:spTgt spid="14"/>
+                                        </p:tgtEl>
+                                        <p:attrNameLst>
+                                          <p:attrName>style.visibility</p:attrName>
+                                        </p:attrNameLst>
+                                      </p:cBhvr>
+                                      <p:to>
+                                        <p:strVal val="hidden"/>
+                                      </p:to>
+                                    </p:set>
+                                  </p:childTnLst>
+                                </p:cTn>
+                              </p:par>
+                              <p:par>
+                                <p:cTn id="47" presetID="2" presetClass="exit" presetSubtype="4" fill="hold" grpId="1" nodeType="withEffect">
+                                  <p:stCondLst>
+                                    <p:cond delay="0"/>
+                                  </p:stCondLst>
+                                  <p:childTnLst>
+                                    <p:anim calcmode="lin" valueType="num">
+                                      <p:cBhvr additive="base">
+                                        <p:cTn id="48" dur="500"/>
+                                        <p:tgtEl>
+                                          <p:spTgt spid="13"/>
+                                        </p:tgtEl>
+                                        <p:attrNameLst>
+                                          <p:attrName>ppt_x</p:attrName>
+                                        </p:attrNameLst>
+                                      </p:cBhvr>
+                                      <p:tavLst>
+                                        <p:tav tm="0">
+                                          <p:val>
+                                            <p:strVal val="ppt_x"/>
+                                          </p:val>
+                                        </p:tav>
+                                        <p:tav tm="100000">
+                                          <p:val>
+                                            <p:strVal val="ppt_x"/>
+                                          </p:val>
+                                        </p:tav>
+                                      </p:tavLst>
+                                    </p:anim>
+                                    <p:anim calcmode="lin" valueType="num">
+                                      <p:cBhvr additive="base">
+                                        <p:cTn id="49" dur="500"/>
+                                        <p:tgtEl>
+                                          <p:spTgt spid="13"/>
+                                        </p:tgtEl>
+                                        <p:attrNameLst>
+                                          <p:attrName>ppt_y</p:attrName>
+                                        </p:attrNameLst>
+                                      </p:cBhvr>
+                                      <p:tavLst>
+                                        <p:tav tm="0">
+                                          <p:val>
+                                            <p:strVal val="ppt_y"/>
+                                          </p:val>
+                                        </p:tav>
+                                        <p:tav tm="100000">
+                                          <p:val>
+                                            <p:strVal val="1+ppt_h/2"/>
+                                          </p:val>
+                                        </p:tav>
+                                      </p:tavLst>
+                                    </p:anim>
+                                    <p:set>
+                                      <p:cBhvr>
+                                        <p:cTn id="50" dur="1" fill="hold">
+                                          <p:stCondLst>
+                                            <p:cond delay="499"/>
+                                          </p:stCondLst>
+                                        </p:cTn>
+                                        <p:tgtEl>
+                                          <p:spTgt spid="13"/>
+                                        </p:tgtEl>
+                                        <p:attrNameLst>
+                                          <p:attrName>style.visibility</p:attrName>
+                                        </p:attrNameLst>
+                                      </p:cBhvr>
+                                      <p:to>
+                                        <p:strVal val="hidden"/>
+                                      </p:to>
+                                    </p:set>
+                                  </p:childTnLst>
+                                </p:cTn>
+                              </p:par>
+                              <p:par>
+                                <p:cTn id="51" presetID="2" presetClass="exit" presetSubtype="4" fill="hold" nodeType="withEffect">
+                                  <p:stCondLst>
+                                    <p:cond delay="0"/>
+                                  </p:stCondLst>
+                                  <p:childTnLst>
+                                    <p:anim calcmode="lin" valueType="num">
+                                      <p:cBhvr additive="base">
+                                        <p:cTn id="52" dur="500"/>
+                                        <p:tgtEl>
+                                          <p:spTgt spid="30"/>
+                                        </p:tgtEl>
+                                        <p:attrNameLst>
+                                          <p:attrName>ppt_x</p:attrName>
+                                        </p:attrNameLst>
+                                      </p:cBhvr>
+                                      <p:tavLst>
+                                        <p:tav tm="0">
+                                          <p:val>
+                                            <p:strVal val="ppt_x"/>
+                                          </p:val>
+                                        </p:tav>
+                                        <p:tav tm="100000">
+                                          <p:val>
+                                            <p:strVal val="ppt_x"/>
+                                          </p:val>
+                                        </p:tav>
+                                      </p:tavLst>
+                                    </p:anim>
+                                    <p:anim calcmode="lin" valueType="num">
+                                      <p:cBhvr additive="base">
+                                        <p:cTn id="53" dur="500"/>
+                                        <p:tgtEl>
+                                          <p:spTgt spid="30"/>
+                                        </p:tgtEl>
+                                        <p:attrNameLst>
+                                          <p:attrName>ppt_y</p:attrName>
+                                        </p:attrNameLst>
+                                      </p:cBhvr>
+                                      <p:tavLst>
+                                        <p:tav tm="0">
+                                          <p:val>
+                                            <p:strVal val="ppt_y"/>
+                                          </p:val>
+                                        </p:tav>
+                                        <p:tav tm="100000">
+                                          <p:val>
+                                            <p:strVal val="1+ppt_h/2"/>
+                                          </p:val>
+                                        </p:tav>
+                                      </p:tavLst>
+                                    </p:anim>
+                                    <p:set>
+                                      <p:cBhvr>
+                                        <p:cTn id="54" dur="1" fill="hold">
+                                          <p:stCondLst>
+                                            <p:cond delay="499"/>
+                                          </p:stCondLst>
+                                        </p:cTn>
+                                        <p:tgtEl>
+                                          <p:spTgt spid="30"/>
+                                        </p:tgtEl>
+                                        <p:attrNameLst>
+                                          <p:attrName>style.visibility</p:attrName>
+                                        </p:attrNameLst>
+                                      </p:cBhvr>
+                                      <p:to>
+                                        <p:strVal val="hidden"/>
+                                      </p:to>
+                                    </p:set>
+                                  </p:childTnLst>
+                                </p:cTn>
+                              </p:par>
+                              <p:par>
+                                <p:cTn id="55" presetID="2" presetClass="exit" presetSubtype="4" fill="hold" nodeType="withEffect">
+                                  <p:stCondLst>
+                                    <p:cond delay="0"/>
+                                  </p:stCondLst>
+                                  <p:childTnLst>
+                                    <p:anim calcmode="lin" valueType="num">
+                                      <p:cBhvr additive="base">
+                                        <p:cTn id="56" dur="500"/>
+                                        <p:tgtEl>
+                                          <p:spTgt spid="35"/>
+                                        </p:tgtEl>
+                                        <p:attrNameLst>
+                                          <p:attrName>ppt_x</p:attrName>
+                                        </p:attrNameLst>
+                                      </p:cBhvr>
+                                      <p:tavLst>
+                                        <p:tav tm="0">
+                                          <p:val>
+                                            <p:strVal val="ppt_x"/>
+                                          </p:val>
+                                        </p:tav>
+                                        <p:tav tm="100000">
+                                          <p:val>
+                                            <p:strVal val="ppt_x"/>
+                                          </p:val>
+                                        </p:tav>
+                                      </p:tavLst>
+                                    </p:anim>
+                                    <p:anim calcmode="lin" valueType="num">
+                                      <p:cBhvr additive="base">
+                                        <p:cTn id="57" dur="500"/>
+                                        <p:tgtEl>
+                                          <p:spTgt spid="35"/>
+                                        </p:tgtEl>
+                                        <p:attrNameLst>
+                                          <p:attrName>ppt_y</p:attrName>
+                                        </p:attrNameLst>
+                                      </p:cBhvr>
+                                      <p:tavLst>
+                                        <p:tav tm="0">
+                                          <p:val>
+                                            <p:strVal val="ppt_y"/>
+                                          </p:val>
+                                        </p:tav>
+                                        <p:tav tm="100000">
+                                          <p:val>
+                                            <p:strVal val="1+ppt_h/2"/>
+                                          </p:val>
+                                        </p:tav>
+                                      </p:tavLst>
+                                    </p:anim>
+                                    <p:set>
+                                      <p:cBhvr>
+                                        <p:cTn id="58" dur="1" fill="hold">
+                                          <p:stCondLst>
+                                            <p:cond delay="499"/>
+                                          </p:stCondLst>
+                                        </p:cTn>
+                                        <p:tgtEl>
+                                          <p:spTgt spid="35"/>
+                                        </p:tgtEl>
+                                        <p:attrNameLst>
+                                          <p:attrName>style.visibility</p:attrName>
+                                        </p:attrNameLst>
+                                      </p:cBhvr>
+                                      <p:to>
+                                        <p:strVal val="hidden"/>
+                                      </p:to>
+                                    </p:set>
+                                  </p:childTnLst>
+                                </p:cTn>
+                              </p:par>
+                              <p:par>
+                                <p:cTn id="59" presetID="2" presetClass="exit" presetSubtype="4" fill="hold" nodeType="withEffect">
+                                  <p:stCondLst>
+                                    <p:cond delay="0"/>
+                                  </p:stCondLst>
+                                  <p:childTnLst>
+                                    <p:anim calcmode="lin" valueType="num">
+                                      <p:cBhvr additive="base">
+                                        <p:cTn id="60" dur="500"/>
+                                        <p:tgtEl>
+                                          <p:spTgt spid="24"/>
+                                        </p:tgtEl>
+                                        <p:attrNameLst>
+                                          <p:attrName>ppt_x</p:attrName>
+                                        </p:attrNameLst>
+                                      </p:cBhvr>
+                                      <p:tavLst>
+                                        <p:tav tm="0">
+                                          <p:val>
+                                            <p:strVal val="ppt_x"/>
+                                          </p:val>
+                                        </p:tav>
+                                        <p:tav tm="100000">
+                                          <p:val>
+                                            <p:strVal val="ppt_x"/>
+                                          </p:val>
+                                        </p:tav>
+                                      </p:tavLst>
+                                    </p:anim>
+                                    <p:anim calcmode="lin" valueType="num">
+                                      <p:cBhvr additive="base">
+                                        <p:cTn id="61" dur="500"/>
+                                        <p:tgtEl>
+                                          <p:spTgt spid="24"/>
+                                        </p:tgtEl>
+                                        <p:attrNameLst>
+                                          <p:attrName>ppt_y</p:attrName>
+                                        </p:attrNameLst>
+                                      </p:cBhvr>
+                                      <p:tavLst>
+                                        <p:tav tm="0">
+                                          <p:val>
+                                            <p:strVal val="ppt_y"/>
+                                          </p:val>
+                                        </p:tav>
+                                        <p:tav tm="100000">
+                                          <p:val>
+                                            <p:strVal val="1+ppt_h/2"/>
+                                          </p:val>
+                                        </p:tav>
+                                      </p:tavLst>
+                                    </p:anim>
+                                    <p:set>
+                                      <p:cBhvr>
+                                        <p:cTn id="62" dur="1" fill="hold">
+                                          <p:stCondLst>
+                                            <p:cond delay="499"/>
+                                          </p:stCondLst>
+                                        </p:cTn>
+                                        <p:tgtEl>
+                                          <p:spTgt spid="24"/>
+                                        </p:tgtEl>
+                                        <p:attrNameLst>
+                                          <p:attrName>style.visibility</p:attrName>
+                                        </p:attrNameLst>
+                                      </p:cBhvr>
+                                      <p:to>
+                                        <p:strVal val="hidden"/>
+                                      </p:to>
+                                    </p:set>
+                                  </p:childTnLst>
+                                </p:cTn>
+                              </p:par>
+                              <p:par>
+                                <p:cTn id="63" presetID="2" presetClass="entr" presetSubtype="4" fill="hold" grpId="0" nodeType="withEffect">
+                                  <p:stCondLst>
+                                    <p:cond delay="0"/>
+                                  </p:stCondLst>
+                                  <p:childTnLst>
+                                    <p:set>
+                                      <p:cBhvr>
+                                        <p:cTn id="64" dur="1" fill="hold">
+                                          <p:stCondLst>
+                                            <p:cond delay="0"/>
+                                          </p:stCondLst>
+                                        </p:cTn>
+                                        <p:tgtEl>
+                                          <p:spTgt spid="34"/>
+                                        </p:tgtEl>
+                                        <p:attrNameLst>
+                                          <p:attrName>style.visibility</p:attrName>
+                                        </p:attrNameLst>
+                                      </p:cBhvr>
+                                      <p:to>
+                                        <p:strVal val="visible"/>
+                                      </p:to>
+                                    </p:set>
+                                    <p:anim calcmode="lin" valueType="num">
+                                      <p:cBhvr additive="base">
+                                        <p:cTn id="65" dur="500" fill="hold"/>
+                                        <p:tgtEl>
+                                          <p:spTgt spid="34"/>
+                                        </p:tgtEl>
+                                        <p:attrNameLst>
+                                          <p:attrName>ppt_x</p:attrName>
+                                        </p:attrNameLst>
+                                      </p:cBhvr>
+                                      <p:tavLst>
+                                        <p:tav tm="0">
+                                          <p:val>
+                                            <p:strVal val="#ppt_x"/>
+                                          </p:val>
+                                        </p:tav>
+                                        <p:tav tm="100000">
+                                          <p:val>
+                                            <p:strVal val="#ppt_x"/>
+                                          </p:val>
+                                        </p:tav>
+                                      </p:tavLst>
+                                    </p:anim>
+                                    <p:anim calcmode="lin" valueType="num">
+                                      <p:cBhvr additive="base">
+                                        <p:cTn id="66" dur="500" fill="hold"/>
+                                        <p:tgtEl>
+                                          <p:spTgt spid="34"/>
+                                        </p:tgtEl>
+                                        <p:attrNameLst>
+                                          <p:attrName>ppt_y</p:attrName>
+                                        </p:attrNameLst>
+                                      </p:cBhvr>
+                                      <p:tavLst>
+                                        <p:tav tm="0">
+                                          <p:val>
+                                            <p:strVal val="1+#ppt_h/2"/>
+                                          </p:val>
+                                        </p:tav>
+                                        <p:tav tm="100000">
+                                          <p:val>
+                                            <p:strVal val="#ppt_y"/>
+                                          </p:val>
+                                        </p:tav>
+                                      </p:tavLst>
+                                    </p:anim>
+                                  </p:childTnLst>
+                                </p:cTn>
+                              </p:par>
+                              <p:par>
+                                <p:cTn id="67" presetID="2" presetClass="entr" presetSubtype="4" fill="hold" nodeType="withEffect">
+                                  <p:stCondLst>
+                                    <p:cond delay="0"/>
+                                  </p:stCondLst>
+                                  <p:childTnLst>
+                                    <p:set>
+                                      <p:cBhvr>
+                                        <p:cTn id="68" dur="1" fill="hold">
+                                          <p:stCondLst>
+                                            <p:cond delay="0"/>
+                                          </p:stCondLst>
+                                        </p:cTn>
+                                        <p:tgtEl>
+                                          <p:spTgt spid="38"/>
+                                        </p:tgtEl>
+                                        <p:attrNameLst>
+                                          <p:attrName>style.visibility</p:attrName>
+                                        </p:attrNameLst>
+                                      </p:cBhvr>
+                                      <p:to>
+                                        <p:strVal val="visible"/>
+                                      </p:to>
+                                    </p:set>
+                                    <p:anim calcmode="lin" valueType="num">
+                                      <p:cBhvr additive="base">
+                                        <p:cTn id="69" dur="500" fill="hold"/>
+                                        <p:tgtEl>
+                                          <p:spTgt spid="38"/>
+                                        </p:tgtEl>
+                                        <p:attrNameLst>
+                                          <p:attrName>ppt_x</p:attrName>
+                                        </p:attrNameLst>
+                                      </p:cBhvr>
+                                      <p:tavLst>
+                                        <p:tav tm="0">
+                                          <p:val>
+                                            <p:strVal val="#ppt_x"/>
+                                          </p:val>
+                                        </p:tav>
+                                        <p:tav tm="100000">
+                                          <p:val>
+                                            <p:strVal val="#ppt_x"/>
+                                          </p:val>
+                                        </p:tav>
+                                      </p:tavLst>
+                                    </p:anim>
+                                    <p:anim calcmode="lin" valueType="num">
+                                      <p:cBhvr additive="base">
+                                        <p:cTn id="70" dur="500" fill="hold"/>
+                                        <p:tgtEl>
+                                          <p:spTgt spid="38"/>
+                                        </p:tgtEl>
+                                        <p:attrNameLst>
+                                          <p:attrName>ppt_y</p:attrName>
+                                        </p:attrNameLst>
+                                      </p:cBhvr>
+                                      <p:tavLst>
+                                        <p:tav tm="0">
+                                          <p:val>
+                                            <p:strVal val="1+#ppt_h/2"/>
+                                          </p:val>
+                                        </p:tav>
+                                        <p:tav tm="100000">
+                                          <p:val>
+                                            <p:strVal val="#ppt_y"/>
+                                          </p:val>
+                                        </p:tav>
+                                      </p:tavLst>
+                                    </p:anim>
+                                  </p:childTnLst>
+                                </p:cTn>
+                              </p:par>
+                              <p:par>
+                                <p:cTn id="71" presetID="2" presetClass="entr" presetSubtype="4" fill="hold" nodeType="withEffect">
+                                  <p:stCondLst>
+                                    <p:cond delay="0"/>
+                                  </p:stCondLst>
+                                  <p:childTnLst>
+                                    <p:set>
+                                      <p:cBhvr>
+                                        <p:cTn id="72" dur="1" fill="hold">
+                                          <p:stCondLst>
+                                            <p:cond delay="0"/>
+                                          </p:stCondLst>
+                                        </p:cTn>
+                                        <p:tgtEl>
+                                          <p:spTgt spid="39"/>
+                                        </p:tgtEl>
+                                        <p:attrNameLst>
+                                          <p:attrName>style.visibility</p:attrName>
+                                        </p:attrNameLst>
+                                      </p:cBhvr>
+                                      <p:to>
+                                        <p:strVal val="visible"/>
+                                      </p:to>
+                                    </p:set>
+                                    <p:anim calcmode="lin" valueType="num">
+                                      <p:cBhvr additive="base">
+                                        <p:cTn id="73" dur="500" fill="hold"/>
+                                        <p:tgtEl>
+                                          <p:spTgt spid="39"/>
+                                        </p:tgtEl>
+                                        <p:attrNameLst>
+                                          <p:attrName>ppt_x</p:attrName>
+                                        </p:attrNameLst>
+                                      </p:cBhvr>
+                                      <p:tavLst>
+                                        <p:tav tm="0">
+                                          <p:val>
+                                            <p:strVal val="#ppt_x"/>
+                                          </p:val>
+                                        </p:tav>
+                                        <p:tav tm="100000">
+                                          <p:val>
+                                            <p:strVal val="#ppt_x"/>
+                                          </p:val>
+                                        </p:tav>
+                                      </p:tavLst>
+                                    </p:anim>
+                                    <p:anim calcmode="lin" valueType="num">
+                                      <p:cBhvr additive="base">
+                                        <p:cTn id="74" dur="500" fill="hold"/>
+                                        <p:tgtEl>
+                                          <p:spTgt spid="39"/>
+                                        </p:tgtEl>
+                                        <p:attrNameLst>
+                                          <p:attrName>ppt_y</p:attrName>
+                                        </p:attrNameLst>
+                                      </p:cBhvr>
+                                      <p:tavLst>
+                                        <p:tav tm="0">
+                                          <p:val>
+                                            <p:strVal val="1+#ppt_h/2"/>
+                                          </p:val>
+                                        </p:tav>
+                                        <p:tav tm="100000">
+                                          <p:val>
+                                            <p:strVal val="#ppt_y"/>
+                                          </p:val>
+                                        </p:tav>
+                                      </p:tavLst>
+                                    </p:anim>
+                                  </p:childTnLst>
+                                </p:cTn>
+                              </p:par>
+                              <p:par>
+                                <p:cTn id="75" presetID="2" presetClass="entr" presetSubtype="4" fill="hold" nodeType="withEffect">
+                                  <p:stCondLst>
+                                    <p:cond delay="0"/>
+                                  </p:stCondLst>
+                                  <p:childTnLst>
+                                    <p:set>
+                                      <p:cBhvr>
+                                        <p:cTn id="76" dur="1" fill="hold">
+                                          <p:stCondLst>
+                                            <p:cond delay="0"/>
+                                          </p:stCondLst>
+                                        </p:cTn>
+                                        <p:tgtEl>
+                                          <p:spTgt spid="37"/>
+                                        </p:tgtEl>
+                                        <p:attrNameLst>
+                                          <p:attrName>style.visibility</p:attrName>
+                                        </p:attrNameLst>
+                                      </p:cBhvr>
+                                      <p:to>
+                                        <p:strVal val="visible"/>
+                                      </p:to>
+                                    </p:set>
+                                    <p:anim calcmode="lin" valueType="num">
+                                      <p:cBhvr additive="base">
+                                        <p:cTn id="77" dur="500" fill="hold"/>
+                                        <p:tgtEl>
+                                          <p:spTgt spid="37"/>
+                                        </p:tgtEl>
+                                        <p:attrNameLst>
+                                          <p:attrName>ppt_x</p:attrName>
+                                        </p:attrNameLst>
+                                      </p:cBhvr>
+                                      <p:tavLst>
+                                        <p:tav tm="0">
+                                          <p:val>
+                                            <p:strVal val="#ppt_x"/>
+                                          </p:val>
+                                        </p:tav>
+                                        <p:tav tm="100000">
+                                          <p:val>
+                                            <p:strVal val="#ppt_x"/>
+                                          </p:val>
+                                        </p:tav>
+                                      </p:tavLst>
+                                    </p:anim>
+                                    <p:anim calcmode="lin" valueType="num">
+                                      <p:cBhvr additive="base">
+                                        <p:cTn id="78" dur="500" fill="hold"/>
+                                        <p:tgtEl>
+                                          <p:spTgt spid="37"/>
+                                        </p:tgtEl>
+                                        <p:attrNameLst>
+                                          <p:attrName>ppt_y</p:attrName>
+                                        </p:attrNameLst>
+                                      </p:cBhvr>
+                                      <p:tavLst>
+                                        <p:tav tm="0">
+                                          <p:val>
+                                            <p:strVal val="1+#ppt_h/2"/>
+                                          </p:val>
+                                        </p:tav>
+                                        <p:tav tm="100000">
+                                          <p:val>
+                                            <p:strVal val="#ppt_y"/>
+                                          </p:val>
+                                        </p:tav>
+                                      </p:tavLst>
+                                    </p:anim>
+                                  </p:childTnLst>
+                                </p:cTn>
+                              </p:par>
+                            </p:childTnLst>
+                          </p:cTn>
+                        </p:par>
+                      </p:childTnLst>
+                    </p:cTn>
+                  </p:par>
+                </p:childTnLst>
+              </p:cTn>
+              <p:prevCondLst>
+                <p:cond evt="onPrev" delay="0">
+                  <p:tgtEl>
+                    <p:sldTgt/>
+                  </p:tgtEl>
+                </p:cond>
+              </p:prevCondLst>
+              <p:nextCondLst>
+                <p:cond evt="onNext" delay="0">
+                  <p:tgtEl>
+                    <p:sldTgt/>
+                  </p:tgtEl>
+                </p:cond>
+              </p:nextCondLst>
+            </p:seq>
+          </p:childTnLst>
+        </p:cTn>
+      </p:par>
+    </p:tnLst>
+    <p:bldLst>
+      <p:bldP spid="13" grpId="0" animBg="1"/>
+      <p:bldP spid="13" grpId="1" animBg="1"/>
+      <p:bldP spid="14" grpId="0" animBg="1"/>
+      <p:bldP spid="14" grpId="1" animBg="1"/>
+      <p:bldP spid="25" grpId="0" animBg="1"/>
+      <p:bldP spid="25" grpId="1" animBg="1"/>
+      <p:bldP spid="26" grpId="0" animBg="1"/>
+      <p:bldP spid="26" grpId="1" animBg="1"/>
+      <p:bldP spid="34" grpId="0" animBg="1"/>
+    </p:bldLst>
+  </p:timing>
 </p:sld>
 </file>
 

</xml_diff>